<commit_message>
2021년 08월 10일 화 오후  6:28:53
</commit_message>
<xml_diff>
--- a/project/1)data분석 프로젝트/발표 문서자료/프로젝트 주제 발표(8팀_부데찌개팀).pptx
+++ b/project/1)data분석 프로젝트/발표 문서자료/프로젝트 주제 발표(8팀_부데찌개팀).pptx
@@ -7,10 +7,11 @@
   <p:sldIdLst>
     <p:sldId id="477" r:id="rId2"/>
     <p:sldId id="479" r:id="rId3"/>
-    <p:sldId id="480" r:id="rId4"/>
-    <p:sldId id="481" r:id="rId5"/>
-    <p:sldId id="482" r:id="rId6"/>
-    <p:sldId id="483" r:id="rId7"/>
+    <p:sldId id="484" r:id="rId4"/>
+    <p:sldId id="480" r:id="rId5"/>
+    <p:sldId id="481" r:id="rId6"/>
+    <p:sldId id="482" r:id="rId7"/>
+    <p:sldId id="483" r:id="rId8"/>
   </p:sldIdLst>
   <p:sldSz cx="12192000" cy="6858000"/>
   <p:notesSz cx="6858000" cy="9144000"/>
@@ -6679,7 +6680,7 @@
         </p:nvSpPr>
         <p:spPr>
           <a:xfrm>
-            <a:off x="550516" y="220617"/>
+            <a:off x="637602" y="232501"/>
             <a:ext cx="10390716" cy="558800"/>
           </a:xfrm>
         </p:spPr>
@@ -6689,112 +6690,150 @@
           <a:p>
             <a:r>
               <a:rPr lang="ko-KR" altLang="en-US" dirty="0"/>
-              <a:t>프로젝트 수행 방향</a:t>
+              <a:t>수집할 데이터 설명</a:t>
+            </a:r>
+          </a:p>
+        </p:txBody>
+      </p:sp>
+      <p:pic>
+        <p:nvPicPr>
+          <p:cNvPr id="7" name="내용 개체 틀 6" descr="테이블이(가) 표시된 사진&#10;&#10;자동 생성된 설명">
+            <a:extLst>
+              <a:ext uri="{FF2B5EF4-FFF2-40B4-BE49-F238E27FC236}">
+                <a16:creationId xmlns:a16="http://schemas.microsoft.com/office/drawing/2014/main" id="{A7087B6C-A168-43C7-BD9E-7F933CBFBF98}"/>
+              </a:ext>
+            </a:extLst>
+          </p:cNvPr>
+          <p:cNvPicPr>
+            <a:picLocks noGrp="1" noChangeAspect="1"/>
+          </p:cNvPicPr>
+          <p:nvPr>
+            <p:ph idx="1"/>
+          </p:nvPr>
+        </p:nvPicPr>
+        <p:blipFill>
+          <a:blip r:embed="rId2"/>
+          <a:stretch>
+            <a:fillRect/>
+          </a:stretch>
+        </p:blipFill>
+        <p:spPr>
+          <a:xfrm>
+            <a:off x="6593747" y="2139240"/>
+            <a:ext cx="5000361" cy="3688430"/>
+          </a:xfrm>
+        </p:spPr>
+      </p:pic>
+      <p:pic>
+        <p:nvPicPr>
+          <p:cNvPr id="5" name="그림 4" descr="테이블이(가) 표시된 사진&#10;&#10;자동 생성된 설명">
+            <a:extLst>
+              <a:ext uri="{FF2B5EF4-FFF2-40B4-BE49-F238E27FC236}">
+                <a16:creationId xmlns:a16="http://schemas.microsoft.com/office/drawing/2014/main" id="{55C016CB-5444-41A3-9FBB-637DA1127170}"/>
+              </a:ext>
+            </a:extLst>
+          </p:cNvPr>
+          <p:cNvPicPr>
+            <a:picLocks noChangeAspect="1"/>
+          </p:cNvPicPr>
+          <p:nvPr/>
+        </p:nvPicPr>
+        <p:blipFill>
+          <a:blip r:embed="rId3"/>
+          <a:stretch>
+            <a:fillRect/>
+          </a:stretch>
+        </p:blipFill>
+        <p:spPr>
+          <a:xfrm>
+            <a:off x="119721" y="2139240"/>
+            <a:ext cx="6223350" cy="2843820"/>
+          </a:xfrm>
+          <a:prstGeom prst="rect">
+            <a:avLst/>
+          </a:prstGeom>
+        </p:spPr>
+      </p:pic>
+      <p:sp>
+        <p:nvSpPr>
+          <p:cNvPr id="8" name="TextBox 7">
+            <a:extLst>
+              <a:ext uri="{FF2B5EF4-FFF2-40B4-BE49-F238E27FC236}">
+                <a16:creationId xmlns:a16="http://schemas.microsoft.com/office/drawing/2014/main" id="{DCB8002C-551B-4EDD-8A81-248DAF0F25D3}"/>
+              </a:ext>
+            </a:extLst>
+          </p:cNvPr>
+          <p:cNvSpPr txBox="1"/>
+          <p:nvPr/>
+        </p:nvSpPr>
+        <p:spPr>
+          <a:xfrm>
+            <a:off x="1224793" y="1484899"/>
+            <a:ext cx="3959603" cy="461665"/>
+          </a:xfrm>
+          <a:prstGeom prst="rect">
+            <a:avLst/>
+          </a:prstGeom>
+          <a:noFill/>
+        </p:spPr>
+        <p:txBody>
+          <a:bodyPr wrap="square" rtlCol="0">
+            <a:spAutoFit/>
+          </a:bodyPr>
+          <a:lstStyle/>
+          <a:p>
+            <a:r>
+              <a:rPr lang="ko-KR" altLang="en-US" sz="2400" b="1" dirty="0">
+                <a:latin typeface="맑은 고딕" pitchFamily="50" charset="-127"/>
+                <a:ea typeface="맑은 고딕" pitchFamily="50" charset="-127"/>
+              </a:rPr>
+              <a:t>구별 부동산 가격 데이터</a:t>
             </a:r>
           </a:p>
         </p:txBody>
       </p:sp>
       <p:sp>
         <p:nvSpPr>
-          <p:cNvPr id="3" name="내용 개체 틀 2"/>
-          <p:cNvSpPr>
-            <a:spLocks noGrp="1"/>
-          </p:cNvSpPr>
-          <p:nvPr>
-            <p:ph idx="1"/>
-          </p:nvPr>
+          <p:cNvPr id="9" name="TextBox 8">
+            <a:extLst>
+              <a:ext uri="{FF2B5EF4-FFF2-40B4-BE49-F238E27FC236}">
+                <a16:creationId xmlns:a16="http://schemas.microsoft.com/office/drawing/2014/main" id="{54693143-C3C1-4515-A0FE-6D0FF1D380DF}"/>
+              </a:ext>
+            </a:extLst>
+          </p:cNvPr>
+          <p:cNvSpPr txBox="1"/>
+          <p:nvPr/>
         </p:nvSpPr>
         <p:spPr>
           <a:xfrm>
-            <a:off x="650361" y="2053999"/>
-            <a:ext cx="11082867" cy="4024584"/>
+            <a:off x="7007604" y="1484898"/>
+            <a:ext cx="4653093" cy="461665"/>
           </a:xfrm>
+          <a:prstGeom prst="rect">
+            <a:avLst/>
+          </a:prstGeom>
+          <a:noFill/>
         </p:spPr>
         <p:txBody>
-          <a:bodyPr/>
+          <a:bodyPr wrap="square" rtlCol="0">
+            <a:spAutoFit/>
+          </a:bodyPr>
           <a:lstStyle/>
           <a:p>
-            <a:pPr latinLnBrk="0"/>
-            <a:r>
-              <a:rPr lang="ko-KR" altLang="ko-KR" sz="2000" dirty="0"/>
-              <a:t>주요</a:t>
-            </a:r>
-            <a:r>
-              <a:rPr lang="en-US" altLang="ko-KR" sz="2000" dirty="0"/>
-              <a:t> </a:t>
-            </a:r>
-            <a:r>
-              <a:rPr lang="ko-KR" altLang="ko-KR" sz="2000" dirty="0"/>
-              <a:t>분석 내용</a:t>
-            </a:r>
-            <a:endParaRPr lang="en-US" altLang="ko-KR" sz="2000" dirty="0"/>
-          </a:p>
-          <a:p>
-            <a:pPr latinLnBrk="0"/>
-            <a:endParaRPr lang="ko-KR" altLang="ko-KR" sz="2000" dirty="0"/>
-          </a:p>
-          <a:p>
-            <a:pPr latinLnBrk="0"/>
-            <a:r>
-              <a:rPr lang="ko-KR" altLang="ko-KR" sz="2000" dirty="0"/>
-              <a:t>위에서 나열한 각각의 요인들이 현재 부동산 실</a:t>
-            </a:r>
-            <a:r>
-              <a:rPr lang="en-US" altLang="ko-KR" sz="2000" dirty="0"/>
-              <a:t> </a:t>
-            </a:r>
-            <a:r>
-              <a:rPr lang="ko-KR" altLang="ko-KR" sz="2000" dirty="0"/>
-              <a:t>거래가와 어떠한 </a:t>
-            </a:r>
-            <a:r>
-              <a:rPr lang="ko-KR" altLang="ko-KR" sz="2000" dirty="0">
-                <a:solidFill>
-                  <a:srgbClr val="FF0000"/>
-                </a:solidFill>
+            <a:r>
+              <a:rPr lang="ko-KR" altLang="en-US" sz="2400" b="1" dirty="0">
+                <a:latin typeface="맑은 고딕" pitchFamily="50" charset="-127"/>
+                <a:ea typeface="맑은 고딕" pitchFamily="50" charset="-127"/>
               </a:rPr>
-              <a:t>유의미한 관계</a:t>
-            </a:r>
-            <a:r>
-              <a:rPr lang="ko-KR" altLang="ko-KR" sz="2000" dirty="0"/>
-              <a:t>가 있는지를 중점적으로 분석</a:t>
-            </a:r>
-          </a:p>
-          <a:p>
-            <a:pPr marL="0" indent="0" latinLnBrk="0">
-              <a:buNone/>
-            </a:pPr>
-            <a:endParaRPr lang="ko-KR" altLang="ko-KR" sz="2000" dirty="0"/>
-          </a:p>
-          <a:p>
-            <a:pPr latinLnBrk="0"/>
-            <a:r>
-              <a:rPr lang="ko-KR" altLang="ko-KR" sz="2000" dirty="0"/>
-              <a:t>기대 효과</a:t>
-            </a:r>
-            <a:endParaRPr lang="en-US" altLang="ko-KR" sz="2000" dirty="0"/>
-          </a:p>
-          <a:p>
-            <a:pPr latinLnBrk="0"/>
-            <a:endParaRPr lang="ko-KR" altLang="ko-KR" sz="2000" dirty="0"/>
-          </a:p>
-          <a:p>
-            <a:r>
-              <a:rPr lang="ko-KR" altLang="ko-KR" sz="2000" dirty="0"/>
-              <a:t>부동산 가격에 영향에 미치는 여러 요인들이 실제로 유효한지 사실관계를 파악 할 수 있다</a:t>
-            </a:r>
-            <a:r>
-              <a:rPr lang="en-US" altLang="ko-KR" sz="2000" dirty="0"/>
-              <a:t>.</a:t>
-            </a:r>
-            <a:endParaRPr lang="ko-KR" altLang="en-US" sz="2000" dirty="0"/>
+              <a:t>구별 연령별 인구 현황 데이터</a:t>
+            </a:r>
           </a:p>
         </p:txBody>
       </p:sp>
     </p:spTree>
     <p:extLst>
       <p:ext uri="{BB962C8B-B14F-4D97-AF65-F5344CB8AC3E}">
-        <p14:creationId xmlns:p14="http://schemas.microsoft.com/office/powerpoint/2010/main" val="3577313083"/>
+        <p14:creationId xmlns:p14="http://schemas.microsoft.com/office/powerpoint/2010/main" val="3871199328"/>
       </p:ext>
     </p:extLst>
   </p:cSld>
@@ -6833,7 +6872,7 @@
         </p:nvSpPr>
         <p:spPr>
           <a:xfrm>
-            <a:off x="900642" y="241210"/>
+            <a:off x="550516" y="220617"/>
             <a:ext cx="10390716" cy="558800"/>
           </a:xfrm>
         </p:spPr>
@@ -6843,7 +6882,7 @@
           <a:p>
             <a:r>
               <a:rPr lang="ko-KR" altLang="en-US" dirty="0"/>
-              <a:t>역할 분담 및 일정</a:t>
+              <a:t>프로젝트 수행 방향</a:t>
             </a:r>
           </a:p>
         </p:txBody>
@@ -6858,179 +6897,97 @@
             <p:ph idx="1"/>
           </p:nvPr>
         </p:nvSpPr>
-        <p:spPr/>
+        <p:spPr>
+          <a:xfrm>
+            <a:off x="650361" y="2053999"/>
+            <a:ext cx="11082867" cy="4024584"/>
+          </a:xfrm>
+        </p:spPr>
         <p:txBody>
           <a:bodyPr/>
           <a:lstStyle/>
           <a:p>
             <a:pPr latinLnBrk="0"/>
             <a:r>
-              <a:rPr lang="ko-KR" altLang="ko-KR" dirty="0"/>
-              <a:t>● 역할분담</a:t>
-            </a:r>
-            <a:endParaRPr lang="en-US" altLang="ko-KR" dirty="0"/>
+              <a:rPr lang="ko-KR" altLang="ko-KR" sz="2000" dirty="0"/>
+              <a:t>주요</a:t>
+            </a:r>
+            <a:r>
+              <a:rPr lang="en-US" altLang="ko-KR" sz="2000" dirty="0"/>
+              <a:t> </a:t>
+            </a:r>
+            <a:r>
+              <a:rPr lang="ko-KR" altLang="ko-KR" sz="2000" dirty="0"/>
+              <a:t>분석 내용</a:t>
+            </a:r>
+            <a:endParaRPr lang="en-US" altLang="ko-KR" sz="2000" dirty="0"/>
           </a:p>
           <a:p>
             <a:pPr latinLnBrk="0"/>
-            <a:endParaRPr lang="ko-KR" altLang="ko-KR" dirty="0"/>
+            <a:endParaRPr lang="ko-KR" altLang="ko-KR" sz="2000" dirty="0"/>
           </a:p>
           <a:p>
             <a:pPr latinLnBrk="0"/>
             <a:r>
-              <a:rPr lang="ko-KR" altLang="ko-KR" dirty="0"/>
-              <a:t>팀장</a:t>
-            </a:r>
-            <a:r>
-              <a:rPr lang="ko-KR" altLang="ko-KR" dirty="0">
+              <a:rPr lang="ko-KR" altLang="ko-KR" sz="2000" dirty="0"/>
+              <a:t>위에서 나열한 각각의 요인들이 현재 부동산 실</a:t>
+            </a:r>
+            <a:r>
+              <a:rPr lang="en-US" altLang="ko-KR" sz="2000" dirty="0"/>
+              <a:t> </a:t>
+            </a:r>
+            <a:r>
+              <a:rPr lang="ko-KR" altLang="ko-KR" sz="2000" dirty="0"/>
+              <a:t>거래가와 어떠한 </a:t>
+            </a:r>
+            <a:r>
+              <a:rPr lang="ko-KR" altLang="ko-KR" sz="2000" dirty="0">
                 <a:solidFill>
                   <a:srgbClr val="FF0000"/>
                 </a:solidFill>
               </a:rPr>
-              <a:t> </a:t>
-            </a:r>
-            <a:r>
-              <a:rPr lang="ko-KR" altLang="ko-KR" dirty="0" err="1"/>
-              <a:t>김문혁</a:t>
-            </a:r>
-            <a:r>
-              <a:rPr lang="ko-KR" altLang="ko-KR" dirty="0"/>
-              <a:t> </a:t>
-            </a:r>
-            <a:r>
-              <a:rPr lang="en-US" altLang="ko-KR" dirty="0"/>
-              <a:t>: </a:t>
-            </a:r>
-            <a:r>
-              <a:rPr lang="ko-KR" altLang="ko-KR" dirty="0"/>
-              <a:t>데이터 수집</a:t>
-            </a:r>
-            <a:r>
-              <a:rPr lang="en-US" altLang="ko-KR" dirty="0"/>
-              <a:t>(</a:t>
-            </a:r>
-            <a:r>
-              <a:rPr lang="ko-KR" altLang="ko-KR" dirty="0" err="1"/>
-              <a:t>크롤링</a:t>
-            </a:r>
-            <a:r>
-              <a:rPr lang="en-US" altLang="ko-KR" dirty="0"/>
-              <a:t>)</a:t>
+              <a:t>유의미한 관계</a:t>
+            </a:r>
+            <a:r>
+              <a:rPr lang="ko-KR" altLang="ko-KR" sz="2000" dirty="0"/>
+              <a:t>가 있는지를 중점적으로 분석</a:t>
             </a:r>
           </a:p>
           <a:p>
             <a:pPr marL="0" indent="0" latinLnBrk="0">
               <a:buNone/>
             </a:pPr>
-            <a:endParaRPr lang="ko-KR" altLang="ko-KR" dirty="0"/>
+            <a:endParaRPr lang="ko-KR" altLang="ko-KR" sz="2000" dirty="0"/>
           </a:p>
           <a:p>
             <a:pPr latinLnBrk="0"/>
             <a:r>
-              <a:rPr lang="ko-KR" altLang="ko-KR" dirty="0"/>
-              <a:t>팀원 </a:t>
-            </a:r>
-            <a:r>
-              <a:rPr lang="ko-KR" altLang="ko-KR" dirty="0" err="1"/>
-              <a:t>장건희</a:t>
-            </a:r>
-            <a:r>
-              <a:rPr lang="ko-KR" altLang="ko-KR" dirty="0"/>
-              <a:t> </a:t>
-            </a:r>
-            <a:r>
-              <a:rPr lang="en-US" altLang="ko-KR" dirty="0"/>
-              <a:t>: </a:t>
-            </a:r>
-            <a:r>
-              <a:rPr lang="ko-KR" altLang="ko-KR" dirty="0"/>
-              <a:t>데이터 분석</a:t>
-            </a:r>
-            <a:endParaRPr lang="en-US" altLang="ko-KR" dirty="0"/>
+              <a:rPr lang="ko-KR" altLang="ko-KR" sz="2000" dirty="0"/>
+              <a:t>기대 효과</a:t>
+            </a:r>
+            <a:endParaRPr lang="en-US" altLang="ko-KR" sz="2000" dirty="0"/>
           </a:p>
           <a:p>
             <a:pPr latinLnBrk="0"/>
-            <a:endParaRPr lang="ko-KR" altLang="ko-KR" dirty="0"/>
-          </a:p>
-          <a:p>
-            <a:pPr latinLnBrk="0"/>
-            <a:r>
-              <a:rPr lang="ko-KR" altLang="ko-KR" dirty="0"/>
-              <a:t>팀원 </a:t>
-            </a:r>
-            <a:r>
-              <a:rPr lang="ko-KR" altLang="ko-KR" dirty="0" err="1"/>
-              <a:t>손동기</a:t>
-            </a:r>
-            <a:r>
-              <a:rPr lang="ko-KR" altLang="ko-KR" dirty="0"/>
-              <a:t> </a:t>
-            </a:r>
-            <a:r>
-              <a:rPr lang="en-US" altLang="ko-KR" dirty="0"/>
-              <a:t>: </a:t>
-            </a:r>
-            <a:r>
-              <a:rPr lang="ko-KR" altLang="ko-KR" dirty="0"/>
-              <a:t>데이터 수집 및 분석</a:t>
-            </a:r>
-            <a:endParaRPr lang="en-US" altLang="ko-KR" dirty="0"/>
-          </a:p>
-          <a:p>
-            <a:pPr latinLnBrk="0"/>
-            <a:endParaRPr lang="ko-KR" altLang="ko-KR" dirty="0"/>
-          </a:p>
-          <a:p>
-            <a:pPr latinLnBrk="0"/>
-            <a:r>
-              <a:rPr lang="ko-KR" altLang="ko-KR" dirty="0"/>
-              <a:t>팀원 김희진 </a:t>
-            </a:r>
-            <a:r>
-              <a:rPr lang="en-US" altLang="ko-KR" dirty="0"/>
-              <a:t>: </a:t>
-            </a:r>
-            <a:r>
-              <a:rPr lang="ko-KR" altLang="ko-KR" dirty="0"/>
-              <a:t>데이터 시각화</a:t>
-            </a:r>
-            <a:endParaRPr lang="en-US" altLang="ko-KR" dirty="0"/>
-          </a:p>
-          <a:p>
-            <a:pPr latinLnBrk="0"/>
-            <a:endParaRPr lang="ko-KR" altLang="ko-KR" dirty="0"/>
-          </a:p>
-          <a:p>
-            <a:pPr latinLnBrk="0"/>
-            <a:r>
-              <a:rPr lang="ko-KR" altLang="ko-KR" dirty="0"/>
-              <a:t>팀원 </a:t>
-            </a:r>
-            <a:r>
-              <a:rPr lang="ko-KR" altLang="ko-KR" dirty="0" err="1"/>
-              <a:t>문세웅</a:t>
-            </a:r>
-            <a:r>
-              <a:rPr lang="ko-KR" altLang="ko-KR" dirty="0"/>
-              <a:t> </a:t>
-            </a:r>
-            <a:r>
-              <a:rPr lang="en-US" altLang="ko-KR" dirty="0"/>
-              <a:t>: </a:t>
-            </a:r>
-            <a:r>
-              <a:rPr lang="ko-KR" altLang="ko-KR" dirty="0"/>
-              <a:t>데이터 분석</a:t>
-            </a:r>
-          </a:p>
-          <a:p>
-            <a:endParaRPr lang="ko-KR" altLang="en-US" dirty="0"/>
+            <a:endParaRPr lang="ko-KR" altLang="ko-KR" sz="2000" dirty="0"/>
+          </a:p>
+          <a:p>
+            <a:r>
+              <a:rPr lang="ko-KR" altLang="ko-KR" sz="2000" dirty="0"/>
+              <a:t>부동산 가격에 영향에 미치는 여러 요인들이 실제로 유효한지 사실관계를 파악 할 수 있다</a:t>
+            </a:r>
+            <a:r>
+              <a:rPr lang="en-US" altLang="ko-KR" sz="2000" dirty="0"/>
+              <a:t>.</a:t>
+            </a:r>
+            <a:endParaRPr lang="ko-KR" altLang="en-US" sz="2000" dirty="0"/>
           </a:p>
         </p:txBody>
       </p:sp>
     </p:spTree>
     <p:extLst>
       <p:ext uri="{BB962C8B-B14F-4D97-AF65-F5344CB8AC3E}">
-        <p14:creationId xmlns:p14="http://schemas.microsoft.com/office/powerpoint/2010/main" val="2560110284"/>
+        <p14:creationId xmlns:p14="http://schemas.microsoft.com/office/powerpoint/2010/main" val="3577313083"/>
       </p:ext>
     </p:extLst>
   </p:cSld>
@@ -7069,7 +7026,7 @@
         </p:nvSpPr>
         <p:spPr>
           <a:xfrm>
-            <a:off x="768231" y="258627"/>
+            <a:off x="900642" y="241210"/>
             <a:ext cx="10390716" cy="558800"/>
           </a:xfrm>
         </p:spPr>
@@ -7094,12 +7051,7 @@
             <p:ph idx="1"/>
           </p:nvPr>
         </p:nvSpPr>
-        <p:spPr>
-          <a:xfrm>
-            <a:off x="700497" y="1022033"/>
-            <a:ext cx="11082867" cy="5232400"/>
-          </a:xfrm>
-        </p:spPr>
+        <p:spPr/>
         <p:txBody>
           <a:bodyPr/>
           <a:lstStyle/>
@@ -7107,7 +7059,7 @@
             <a:pPr latinLnBrk="0"/>
             <a:r>
               <a:rPr lang="ko-KR" altLang="ko-KR" dirty="0"/>
-              <a:t>● 일정 </a:t>
+              <a:t>● 역할분담</a:t>
             </a:r>
             <a:endParaRPr lang="en-US" altLang="ko-KR" dirty="0"/>
           </a:p>
@@ -7118,100 +7070,160 @@
           <a:p>
             <a:pPr latinLnBrk="0"/>
             <a:r>
-              <a:rPr lang="en-US" altLang="ko-KR" sz="2000" dirty="0"/>
-              <a:t>8/6 ~ 8/10 : </a:t>
-            </a:r>
-            <a:r>
-              <a:rPr lang="ko-KR" altLang="ko-KR" sz="2000" dirty="0"/>
-              <a:t>주제 선정 및 일정 수립</a:t>
-            </a:r>
-            <a:endParaRPr lang="en-US" altLang="ko-KR" sz="2000" dirty="0"/>
+              <a:rPr lang="ko-KR" altLang="ko-KR" dirty="0"/>
+              <a:t>팀장</a:t>
+            </a:r>
+            <a:r>
+              <a:rPr lang="ko-KR" altLang="ko-KR" dirty="0">
+                <a:solidFill>
+                  <a:srgbClr val="FF0000"/>
+                </a:solidFill>
+              </a:rPr>
+              <a:t> </a:t>
+            </a:r>
+            <a:r>
+              <a:rPr lang="ko-KR" altLang="ko-KR" dirty="0" err="1"/>
+              <a:t>김문혁</a:t>
+            </a:r>
+            <a:r>
+              <a:rPr lang="ko-KR" altLang="ko-KR" dirty="0"/>
+              <a:t> </a:t>
+            </a:r>
+            <a:r>
+              <a:rPr lang="en-US" altLang="ko-KR" dirty="0"/>
+              <a:t>: </a:t>
+            </a:r>
+            <a:r>
+              <a:rPr lang="ko-KR" altLang="ko-KR" dirty="0"/>
+              <a:t>데이터 수집</a:t>
+            </a:r>
+            <a:r>
+              <a:rPr lang="en-US" altLang="ko-KR" dirty="0"/>
+              <a:t>(</a:t>
+            </a:r>
+            <a:r>
+              <a:rPr lang="ko-KR" altLang="ko-KR" dirty="0" err="1"/>
+              <a:t>크롤링</a:t>
+            </a:r>
+            <a:r>
+              <a:rPr lang="en-US" altLang="ko-KR" dirty="0"/>
+              <a:t>)</a:t>
+            </a:r>
+          </a:p>
+          <a:p>
+            <a:pPr marL="0" indent="0" latinLnBrk="0">
+              <a:buNone/>
+            </a:pPr>
+            <a:endParaRPr lang="ko-KR" altLang="ko-KR" dirty="0"/>
           </a:p>
           <a:p>
             <a:pPr latinLnBrk="0"/>
-            <a:endParaRPr lang="ko-KR" altLang="ko-KR" sz="2000" dirty="0"/>
+            <a:r>
+              <a:rPr lang="ko-KR" altLang="ko-KR" dirty="0"/>
+              <a:t>팀원 </a:t>
+            </a:r>
+            <a:r>
+              <a:rPr lang="ko-KR" altLang="ko-KR" dirty="0" err="1"/>
+              <a:t>장건희</a:t>
+            </a:r>
+            <a:r>
+              <a:rPr lang="ko-KR" altLang="ko-KR" dirty="0"/>
+              <a:t> </a:t>
+            </a:r>
+            <a:r>
+              <a:rPr lang="en-US" altLang="ko-KR" dirty="0"/>
+              <a:t>: </a:t>
+            </a:r>
+            <a:r>
+              <a:rPr lang="ko-KR" altLang="ko-KR" dirty="0"/>
+              <a:t>데이터 분석</a:t>
+            </a:r>
+            <a:endParaRPr lang="en-US" altLang="ko-KR" dirty="0"/>
           </a:p>
           <a:p>
             <a:pPr latinLnBrk="0"/>
-            <a:r>
-              <a:rPr lang="en-US" altLang="ko-KR" sz="2000" dirty="0"/>
-              <a:t>8/11 ~ 8/14 : </a:t>
-            </a:r>
-            <a:r>
-              <a:rPr lang="ko-KR" altLang="ko-KR" sz="2000" dirty="0"/>
-              <a:t>데이터 수집</a:t>
-            </a:r>
-            <a:endParaRPr lang="en-US" altLang="ko-KR" sz="2000" dirty="0"/>
+            <a:endParaRPr lang="ko-KR" altLang="ko-KR" dirty="0"/>
           </a:p>
           <a:p>
             <a:pPr latinLnBrk="0"/>
-            <a:endParaRPr lang="ko-KR" altLang="ko-KR" sz="2000" dirty="0"/>
+            <a:r>
+              <a:rPr lang="ko-KR" altLang="ko-KR" dirty="0"/>
+              <a:t>팀원 </a:t>
+            </a:r>
+            <a:r>
+              <a:rPr lang="ko-KR" altLang="ko-KR" dirty="0" err="1"/>
+              <a:t>손동기</a:t>
+            </a:r>
+            <a:r>
+              <a:rPr lang="ko-KR" altLang="ko-KR" dirty="0"/>
+              <a:t> </a:t>
+            </a:r>
+            <a:r>
+              <a:rPr lang="en-US" altLang="ko-KR" dirty="0"/>
+              <a:t>: </a:t>
+            </a:r>
+            <a:r>
+              <a:rPr lang="ko-KR" altLang="ko-KR" dirty="0"/>
+              <a:t>데이터 수집 및 분석</a:t>
+            </a:r>
+            <a:endParaRPr lang="en-US" altLang="ko-KR" dirty="0"/>
           </a:p>
           <a:p>
             <a:pPr latinLnBrk="0"/>
-            <a:r>
-              <a:rPr lang="en-US" altLang="ko-KR" sz="2000" dirty="0"/>
-              <a:t>8/15 ~ 8/19 : </a:t>
-            </a:r>
-            <a:r>
-              <a:rPr lang="ko-KR" altLang="ko-KR" sz="2000" dirty="0"/>
-              <a:t>데이터 분석 및 검증</a:t>
-            </a:r>
-            <a:endParaRPr lang="en-US" altLang="ko-KR" sz="2000" dirty="0"/>
+            <a:endParaRPr lang="ko-KR" altLang="ko-KR" dirty="0"/>
           </a:p>
           <a:p>
             <a:pPr latinLnBrk="0"/>
-            <a:endParaRPr lang="ko-KR" altLang="ko-KR" sz="2000" dirty="0"/>
+            <a:r>
+              <a:rPr lang="ko-KR" altLang="ko-KR" dirty="0"/>
+              <a:t>팀원 김희진 </a:t>
+            </a:r>
+            <a:r>
+              <a:rPr lang="en-US" altLang="ko-KR" dirty="0"/>
+              <a:t>: </a:t>
+            </a:r>
+            <a:r>
+              <a:rPr lang="ko-KR" altLang="ko-KR" dirty="0"/>
+              <a:t>데이터 시각화</a:t>
+            </a:r>
+            <a:endParaRPr lang="en-US" altLang="ko-KR" dirty="0"/>
           </a:p>
           <a:p>
             <a:pPr latinLnBrk="0"/>
-            <a:r>
-              <a:rPr lang="en-US" altLang="ko-KR" sz="2000" dirty="0"/>
-              <a:t>8/20 ~ 8/22 : </a:t>
-            </a:r>
-            <a:r>
-              <a:rPr lang="ko-KR" altLang="ko-KR" sz="2000" dirty="0"/>
-              <a:t>데이터 시각화</a:t>
-            </a:r>
-            <a:endParaRPr lang="en-US" altLang="ko-KR" sz="2000" dirty="0"/>
+            <a:endParaRPr lang="ko-KR" altLang="ko-KR" dirty="0"/>
           </a:p>
           <a:p>
             <a:pPr latinLnBrk="0"/>
-            <a:endParaRPr lang="ko-KR" altLang="ko-KR" sz="2000" dirty="0"/>
-          </a:p>
-          <a:p>
-            <a:pPr latinLnBrk="0"/>
-            <a:r>
-              <a:rPr lang="en-US" altLang="ko-KR" sz="2000" dirty="0"/>
-              <a:t>8/23 : </a:t>
-            </a:r>
-            <a:r>
-              <a:rPr lang="ko-KR" altLang="ko-KR" sz="2000" dirty="0"/>
-              <a:t>발표 준비</a:t>
-            </a:r>
-            <a:endParaRPr lang="en-US" altLang="ko-KR" sz="2000" dirty="0"/>
-          </a:p>
-          <a:p>
-            <a:pPr latinLnBrk="0"/>
-            <a:endParaRPr lang="ko-KR" altLang="ko-KR" sz="2000" dirty="0"/>
-          </a:p>
-          <a:p>
-            <a:r>
-              <a:rPr lang="en-US" altLang="ko-KR" sz="2000" dirty="0"/>
-              <a:t>8/24 : </a:t>
-            </a:r>
-            <a:r>
-              <a:rPr lang="ko-KR" altLang="ko-KR" sz="2000" dirty="0"/>
-              <a:t>프로젝트 발표</a:t>
-            </a:r>
-            <a:endParaRPr lang="ko-KR" altLang="en-US" sz="2000" dirty="0"/>
+            <a:r>
+              <a:rPr lang="ko-KR" altLang="ko-KR" dirty="0"/>
+              <a:t>팀원 </a:t>
+            </a:r>
+            <a:r>
+              <a:rPr lang="ko-KR" altLang="ko-KR" dirty="0" err="1"/>
+              <a:t>문세웅</a:t>
+            </a:r>
+            <a:r>
+              <a:rPr lang="ko-KR" altLang="ko-KR" dirty="0"/>
+              <a:t> </a:t>
+            </a:r>
+            <a:r>
+              <a:rPr lang="en-US" altLang="ko-KR" dirty="0"/>
+              <a:t>: </a:t>
+            </a:r>
+            <a:r>
+              <a:rPr lang="ko-KR" altLang="ko-KR" dirty="0"/>
+              <a:t>데이터 분석</a:t>
+            </a:r>
+          </a:p>
+          <a:p>
+            <a:endParaRPr lang="ko-KR" altLang="en-US" dirty="0"/>
           </a:p>
         </p:txBody>
       </p:sp>
     </p:spTree>
     <p:extLst>
       <p:ext uri="{BB962C8B-B14F-4D97-AF65-F5344CB8AC3E}">
-        <p14:creationId xmlns:p14="http://schemas.microsoft.com/office/powerpoint/2010/main" val="1058966975"/>
+        <p14:creationId xmlns:p14="http://schemas.microsoft.com/office/powerpoint/2010/main" val="2560110284"/>
       </p:ext>
     </p:extLst>
   </p:cSld>
@@ -7250,6 +7262,187 @@
         </p:nvSpPr>
         <p:spPr>
           <a:xfrm>
+            <a:off x="768231" y="258627"/>
+            <a:ext cx="10390716" cy="558800"/>
+          </a:xfrm>
+        </p:spPr>
+        <p:txBody>
+          <a:bodyPr/>
+          <a:lstStyle/>
+          <a:p>
+            <a:r>
+              <a:rPr lang="ko-KR" altLang="en-US" dirty="0"/>
+              <a:t>역할 분담 및 일정</a:t>
+            </a:r>
+          </a:p>
+        </p:txBody>
+      </p:sp>
+      <p:sp>
+        <p:nvSpPr>
+          <p:cNvPr id="3" name="내용 개체 틀 2"/>
+          <p:cNvSpPr>
+            <a:spLocks noGrp="1"/>
+          </p:cNvSpPr>
+          <p:nvPr>
+            <p:ph idx="1"/>
+          </p:nvPr>
+        </p:nvSpPr>
+        <p:spPr>
+          <a:xfrm>
+            <a:off x="700497" y="1022033"/>
+            <a:ext cx="11082867" cy="5232400"/>
+          </a:xfrm>
+        </p:spPr>
+        <p:txBody>
+          <a:bodyPr/>
+          <a:lstStyle/>
+          <a:p>
+            <a:pPr latinLnBrk="0"/>
+            <a:r>
+              <a:rPr lang="ko-KR" altLang="ko-KR" dirty="0"/>
+              <a:t>● 일정 </a:t>
+            </a:r>
+            <a:endParaRPr lang="en-US" altLang="ko-KR" dirty="0"/>
+          </a:p>
+          <a:p>
+            <a:pPr latinLnBrk="0"/>
+            <a:endParaRPr lang="ko-KR" altLang="ko-KR" dirty="0"/>
+          </a:p>
+          <a:p>
+            <a:pPr latinLnBrk="0"/>
+            <a:r>
+              <a:rPr lang="en-US" altLang="ko-KR" sz="2000" dirty="0"/>
+              <a:t>8/6 ~ 8/10 : </a:t>
+            </a:r>
+            <a:r>
+              <a:rPr lang="ko-KR" altLang="ko-KR" sz="2000" dirty="0"/>
+              <a:t>주제 선정 및 일정 수립</a:t>
+            </a:r>
+            <a:endParaRPr lang="en-US" altLang="ko-KR" sz="2000" dirty="0"/>
+          </a:p>
+          <a:p>
+            <a:pPr latinLnBrk="0"/>
+            <a:endParaRPr lang="ko-KR" altLang="ko-KR" sz="2000" dirty="0"/>
+          </a:p>
+          <a:p>
+            <a:pPr latinLnBrk="0"/>
+            <a:r>
+              <a:rPr lang="en-US" altLang="ko-KR" sz="2000" dirty="0"/>
+              <a:t>8/11 ~ 8/14 : </a:t>
+            </a:r>
+            <a:r>
+              <a:rPr lang="ko-KR" altLang="ko-KR" sz="2000" dirty="0"/>
+              <a:t>데이터 수집</a:t>
+            </a:r>
+            <a:endParaRPr lang="en-US" altLang="ko-KR" sz="2000" dirty="0"/>
+          </a:p>
+          <a:p>
+            <a:pPr latinLnBrk="0"/>
+            <a:endParaRPr lang="ko-KR" altLang="ko-KR" sz="2000" dirty="0"/>
+          </a:p>
+          <a:p>
+            <a:pPr latinLnBrk="0"/>
+            <a:r>
+              <a:rPr lang="en-US" altLang="ko-KR" sz="2000" dirty="0"/>
+              <a:t>8/15 ~ 8/19 : </a:t>
+            </a:r>
+            <a:r>
+              <a:rPr lang="ko-KR" altLang="ko-KR" sz="2000" dirty="0"/>
+              <a:t>데이터 분석 및 검증</a:t>
+            </a:r>
+            <a:endParaRPr lang="en-US" altLang="ko-KR" sz="2000" dirty="0"/>
+          </a:p>
+          <a:p>
+            <a:pPr latinLnBrk="0"/>
+            <a:endParaRPr lang="ko-KR" altLang="ko-KR" sz="2000" dirty="0"/>
+          </a:p>
+          <a:p>
+            <a:pPr latinLnBrk="0"/>
+            <a:r>
+              <a:rPr lang="en-US" altLang="ko-KR" sz="2000" dirty="0"/>
+              <a:t>8/20 ~ 8/22 : </a:t>
+            </a:r>
+            <a:r>
+              <a:rPr lang="ko-KR" altLang="ko-KR" sz="2000" dirty="0"/>
+              <a:t>데이터 시각화</a:t>
+            </a:r>
+            <a:endParaRPr lang="en-US" altLang="ko-KR" sz="2000" dirty="0"/>
+          </a:p>
+          <a:p>
+            <a:pPr latinLnBrk="0"/>
+            <a:endParaRPr lang="ko-KR" altLang="ko-KR" sz="2000" dirty="0"/>
+          </a:p>
+          <a:p>
+            <a:pPr latinLnBrk="0"/>
+            <a:r>
+              <a:rPr lang="en-US" altLang="ko-KR" sz="2000" dirty="0"/>
+              <a:t>8/23 : </a:t>
+            </a:r>
+            <a:r>
+              <a:rPr lang="ko-KR" altLang="ko-KR" sz="2000" dirty="0"/>
+              <a:t>발표 준비</a:t>
+            </a:r>
+            <a:endParaRPr lang="en-US" altLang="ko-KR" sz="2000" dirty="0"/>
+          </a:p>
+          <a:p>
+            <a:pPr latinLnBrk="0"/>
+            <a:endParaRPr lang="ko-KR" altLang="ko-KR" sz="2000" dirty="0"/>
+          </a:p>
+          <a:p>
+            <a:r>
+              <a:rPr lang="en-US" altLang="ko-KR" sz="2000" dirty="0"/>
+              <a:t>8/24 : </a:t>
+            </a:r>
+            <a:r>
+              <a:rPr lang="ko-KR" altLang="ko-KR" sz="2000" dirty="0"/>
+              <a:t>프로젝트 발표</a:t>
+            </a:r>
+            <a:endParaRPr lang="ko-KR" altLang="en-US" sz="2000" dirty="0"/>
+          </a:p>
+        </p:txBody>
+      </p:sp>
+    </p:spTree>
+    <p:extLst>
+      <p:ext uri="{BB962C8B-B14F-4D97-AF65-F5344CB8AC3E}">
+        <p14:creationId xmlns:p14="http://schemas.microsoft.com/office/powerpoint/2010/main" val="1058966975"/>
+      </p:ext>
+    </p:extLst>
+  </p:cSld>
+  <p:clrMapOvr>
+    <a:masterClrMapping/>
+  </p:clrMapOvr>
+</p:sld>
+</file>
+
+<file path=ppt/slides/slide7.xml><?xml version="1.0" encoding="utf-8"?>
+<p:sld xmlns:a="http://schemas.openxmlformats.org/drawingml/2006/main" xmlns:r="http://schemas.openxmlformats.org/officeDocument/2006/relationships" xmlns:p="http://schemas.openxmlformats.org/presentationml/2006/main">
+  <p:cSld>
+    <p:spTree>
+      <p:nvGrpSpPr>
+        <p:cNvPr id="1" name=""/>
+        <p:cNvGrpSpPr/>
+        <p:nvPr/>
+      </p:nvGrpSpPr>
+      <p:grpSpPr>
+        <a:xfrm>
+          <a:off x="0" y="0"/>
+          <a:ext cx="0" cy="0"/>
+          <a:chOff x="0" y="0"/>
+          <a:chExt cx="0" cy="0"/>
+        </a:xfrm>
+      </p:grpSpPr>
+      <p:sp>
+        <p:nvSpPr>
+          <p:cNvPr id="2" name="제목 1"/>
+          <p:cNvSpPr>
+            <a:spLocks noGrp="1"/>
+          </p:cNvSpPr>
+          <p:nvPr>
+            <p:ph type="title"/>
+          </p:nvPr>
+        </p:nvSpPr>
+        <p:spPr>
+          <a:xfrm>
             <a:off x="411179" y="249918"/>
             <a:ext cx="10390716" cy="558800"/>
           </a:xfrm>
@@ -7317,27 +7510,6 @@
             <a:r>
               <a:rPr lang="en-US" altLang="ko-KR" sz="1800" b="0" dirty="0"/>
               <a:t>- Selenium</a:t>
-            </a:r>
-            <a:endParaRPr lang="ko-KR" altLang="ko-KR" sz="1800" b="0" dirty="0"/>
-          </a:p>
-          <a:p>
-            <a:r>
-              <a:rPr lang="en-US" altLang="ko-KR" sz="1800" b="0" dirty="0"/>
-              <a:t>- JavaScript</a:t>
-            </a:r>
-            <a:endParaRPr lang="ko-KR" altLang="ko-KR" sz="1800" b="0" dirty="0"/>
-          </a:p>
-          <a:p>
-            <a:r>
-              <a:rPr lang="en-US" altLang="ko-KR" sz="1800" b="0" dirty="0"/>
-              <a:t>- JQuery</a:t>
-            </a:r>
-            <a:endParaRPr lang="ko-KR" altLang="ko-KR" sz="1800" b="0" dirty="0"/>
-          </a:p>
-          <a:p>
-            <a:r>
-              <a:rPr lang="en-US" altLang="ko-KR" sz="1800" b="0" dirty="0"/>
-              <a:t>- CSS</a:t>
             </a:r>
             <a:endParaRPr lang="ko-KR" altLang="ko-KR" sz="1800" b="0" dirty="0"/>
           </a:p>

</xml_diff>